<commit_message>
webview modal changes, add links to important pages
big changes in this commit, the card still needs styling and content improvements
</commit_message>
<xml_diff>
--- a/assets/stock_pitcher_logo.pptx
+++ b/assets/stock_pitcher_logo.pptx
@@ -7,7 +7,8 @@
   <p:sldIdLst>
     <p:sldId id="256" r:id="rId2"/>
     <p:sldId id="257" r:id="rId3"/>
-    <p:sldId id="258" r:id="rId4"/>
+    <p:sldId id="259" r:id="rId4"/>
+    <p:sldId id="258" r:id="rId5"/>
   </p:sldIdLst>
   <p:sldSz cx="12192000" cy="6858000"/>
   <p:notesSz cx="6858000" cy="9144000"/>
@@ -261,7 +262,7 @@
           <a:p>
             <a:fld id="{AD94A44F-89A4-9943-854E-E7FE492F9B98}" type="datetimeFigureOut">
               <a:rPr lang="en-US" smtClean="0"/>
-              <a:t>5/19/24</a:t>
+              <a:t>5/27/24</a:t>
             </a:fld>
             <a:endParaRPr lang="en-US"/>
           </a:p>
@@ -459,7 +460,7 @@
           <a:p>
             <a:fld id="{AD94A44F-89A4-9943-854E-E7FE492F9B98}" type="datetimeFigureOut">
               <a:rPr lang="en-US" smtClean="0"/>
-              <a:t>5/19/24</a:t>
+              <a:t>5/27/24</a:t>
             </a:fld>
             <a:endParaRPr lang="en-US"/>
           </a:p>
@@ -667,7 +668,7 @@
           <a:p>
             <a:fld id="{AD94A44F-89A4-9943-854E-E7FE492F9B98}" type="datetimeFigureOut">
               <a:rPr lang="en-US" smtClean="0"/>
-              <a:t>5/19/24</a:t>
+              <a:t>5/27/24</a:t>
             </a:fld>
             <a:endParaRPr lang="en-US"/>
           </a:p>
@@ -865,7 +866,7 @@
           <a:p>
             <a:fld id="{AD94A44F-89A4-9943-854E-E7FE492F9B98}" type="datetimeFigureOut">
               <a:rPr lang="en-US" smtClean="0"/>
-              <a:t>5/19/24</a:t>
+              <a:t>5/27/24</a:t>
             </a:fld>
             <a:endParaRPr lang="en-US"/>
           </a:p>
@@ -1140,7 +1141,7 @@
           <a:p>
             <a:fld id="{AD94A44F-89A4-9943-854E-E7FE492F9B98}" type="datetimeFigureOut">
               <a:rPr lang="en-US" smtClean="0"/>
-              <a:t>5/19/24</a:t>
+              <a:t>5/27/24</a:t>
             </a:fld>
             <a:endParaRPr lang="en-US"/>
           </a:p>
@@ -1405,7 +1406,7 @@
           <a:p>
             <a:fld id="{AD94A44F-89A4-9943-854E-E7FE492F9B98}" type="datetimeFigureOut">
               <a:rPr lang="en-US" smtClean="0"/>
-              <a:t>5/19/24</a:t>
+              <a:t>5/27/24</a:t>
             </a:fld>
             <a:endParaRPr lang="en-US"/>
           </a:p>
@@ -1817,7 +1818,7 @@
           <a:p>
             <a:fld id="{AD94A44F-89A4-9943-854E-E7FE492F9B98}" type="datetimeFigureOut">
               <a:rPr lang="en-US" smtClean="0"/>
-              <a:t>5/19/24</a:t>
+              <a:t>5/27/24</a:t>
             </a:fld>
             <a:endParaRPr lang="en-US"/>
           </a:p>
@@ -1958,7 +1959,7 @@
           <a:p>
             <a:fld id="{AD94A44F-89A4-9943-854E-E7FE492F9B98}" type="datetimeFigureOut">
               <a:rPr lang="en-US" smtClean="0"/>
-              <a:t>5/19/24</a:t>
+              <a:t>5/27/24</a:t>
             </a:fld>
             <a:endParaRPr lang="en-US"/>
           </a:p>
@@ -2071,7 +2072,7 @@
           <a:p>
             <a:fld id="{AD94A44F-89A4-9943-854E-E7FE492F9B98}" type="datetimeFigureOut">
               <a:rPr lang="en-US" smtClean="0"/>
-              <a:t>5/19/24</a:t>
+              <a:t>5/27/24</a:t>
             </a:fld>
             <a:endParaRPr lang="en-US"/>
           </a:p>
@@ -2382,7 +2383,7 @@
           <a:p>
             <a:fld id="{AD94A44F-89A4-9943-854E-E7FE492F9B98}" type="datetimeFigureOut">
               <a:rPr lang="en-US" smtClean="0"/>
-              <a:t>5/19/24</a:t>
+              <a:t>5/27/24</a:t>
             </a:fld>
             <a:endParaRPr lang="en-US"/>
           </a:p>
@@ -2670,7 +2671,7 @@
           <a:p>
             <a:fld id="{AD94A44F-89A4-9943-854E-E7FE492F9B98}" type="datetimeFigureOut">
               <a:rPr lang="en-US" smtClean="0"/>
-              <a:t>5/19/24</a:t>
+              <a:t>5/27/24</a:t>
             </a:fld>
             <a:endParaRPr lang="en-US"/>
           </a:p>
@@ -2911,7 +2912,7 @@
           <a:p>
             <a:fld id="{AD94A44F-89A4-9943-854E-E7FE492F9B98}" type="datetimeFigureOut">
               <a:rPr lang="en-US" smtClean="0"/>
-              <a:t>5/19/24</a:t>
+              <a:t>5/27/24</a:t>
             </a:fld>
             <a:endParaRPr lang="en-US"/>
           </a:p>
@@ -3530,6 +3531,127 @@
     <p:bg>
       <p:bgPr>
         <a:solidFill>
+          <a:srgbClr val="32CE32"/>
+        </a:solidFill>
+        <a:effectLst/>
+      </p:bgPr>
+    </p:bg>
+    <p:spTree>
+      <p:nvGrpSpPr>
+        <p:cNvPr id="1" name="">
+          <a:extLst>
+            <a:ext uri="{FF2B5EF4-FFF2-40B4-BE49-F238E27FC236}">
+              <a16:creationId xmlns:a16="http://schemas.microsoft.com/office/drawing/2014/main" id="{19237ECC-5013-8EE2-2C21-6E173A580520}"/>
+            </a:ext>
+          </a:extLst>
+        </p:cNvPr>
+        <p:cNvGrpSpPr/>
+        <p:nvPr/>
+      </p:nvGrpSpPr>
+      <p:grpSpPr>
+        <a:xfrm>
+          <a:off x="0" y="0"/>
+          <a:ext cx="0" cy="0"/>
+          <a:chOff x="0" y="0"/>
+          <a:chExt cx="0" cy="0"/>
+        </a:xfrm>
+      </p:grpSpPr>
+      <p:sp>
+        <p:nvSpPr>
+          <p:cNvPr id="4" name="TextBox 3">
+            <a:extLst>
+              <a:ext uri="{FF2B5EF4-FFF2-40B4-BE49-F238E27FC236}">
+                <a16:creationId xmlns:a16="http://schemas.microsoft.com/office/drawing/2014/main" id="{13A7B641-A078-89D3-BF0B-DB4EC384D33A}"/>
+              </a:ext>
+            </a:extLst>
+          </p:cNvPr>
+          <p:cNvSpPr txBox="1"/>
+          <p:nvPr/>
+        </p:nvSpPr>
+        <p:spPr>
+          <a:xfrm>
+            <a:off x="5366951" y="3429000"/>
+            <a:ext cx="3233351" cy="2554545"/>
+          </a:xfrm>
+          <a:prstGeom prst="rect">
+            <a:avLst/>
+          </a:prstGeom>
+          <a:noFill/>
+        </p:spPr>
+        <p:txBody>
+          <a:bodyPr wrap="square" rtlCol="0" anchor="ctr">
+            <a:spAutoFit/>
+          </a:bodyPr>
+          <a:lstStyle/>
+          <a:p>
+            <a:pPr algn="ctr"/>
+            <a:r>
+              <a:rPr lang="en-US" sz="16000" dirty="0">
+                <a:latin typeface="Aller" panose="02000503030000020004" pitchFamily="2" charset="77"/>
+              </a:rPr>
+              <a:t>💸</a:t>
+            </a:r>
+          </a:p>
+        </p:txBody>
+      </p:sp>
+      <p:sp>
+        <p:nvSpPr>
+          <p:cNvPr id="5" name="TextBox 4">
+            <a:extLst>
+              <a:ext uri="{FF2B5EF4-FFF2-40B4-BE49-F238E27FC236}">
+                <a16:creationId xmlns:a16="http://schemas.microsoft.com/office/drawing/2014/main" id="{A89A8A5F-45DE-832C-45D5-EDF7292D63FC}"/>
+              </a:ext>
+            </a:extLst>
+          </p:cNvPr>
+          <p:cNvSpPr txBox="1"/>
+          <p:nvPr/>
+        </p:nvSpPr>
+        <p:spPr>
+          <a:xfrm>
+            <a:off x="2862649" y="1507525"/>
+            <a:ext cx="3822357" cy="2554545"/>
+          </a:xfrm>
+          <a:prstGeom prst="rect">
+            <a:avLst/>
+          </a:prstGeom>
+          <a:noFill/>
+        </p:spPr>
+        <p:txBody>
+          <a:bodyPr wrap="square" rtlCol="0" anchor="ctr">
+            <a:spAutoFit/>
+          </a:bodyPr>
+          <a:lstStyle/>
+          <a:p>
+            <a:pPr algn="ctr"/>
+            <a:r>
+              <a:rPr lang="en-US" sz="16000" dirty="0">
+                <a:latin typeface="Aller" panose="02000503030000020004" pitchFamily="2" charset="77"/>
+              </a:rPr>
+              <a:t>⚾️</a:t>
+            </a:r>
+            <a:endParaRPr lang="en-US" sz="16000" dirty="0"/>
+          </a:p>
+        </p:txBody>
+      </p:sp>
+    </p:spTree>
+    <p:extLst>
+      <p:ext uri="{BB962C8B-B14F-4D97-AF65-F5344CB8AC3E}">
+        <p14:creationId xmlns:p14="http://schemas.microsoft.com/office/powerpoint/2010/main" val="1438001527"/>
+      </p:ext>
+    </p:extLst>
+  </p:cSld>
+  <p:clrMapOvr>
+    <a:masterClrMapping/>
+  </p:clrMapOvr>
+</p:sld>
+</file>
+
+<file path=ppt/slides/slide4.xml><?xml version="1.0" encoding="utf-8"?>
+<p:sld xmlns:a="http://schemas.openxmlformats.org/drawingml/2006/main" xmlns:r="http://schemas.openxmlformats.org/officeDocument/2006/relationships" xmlns:p="http://schemas.openxmlformats.org/presentationml/2006/main">
+  <p:cSld>
+    <p:bg>
+      <p:bgPr>
+        <a:solidFill>
           <a:srgbClr val="2FCC71"/>
         </a:solidFill>
         <a:effectLst/>

</xml_diff>

<commit_message>
update icon and add Roboto ttf files
</commit_message>
<xml_diff>
--- a/assets/stock_pitcher_logo.pptx
+++ b/assets/stock_pitcher_logo.pptx
@@ -7,8 +7,9 @@
   <p:sldIdLst>
     <p:sldId id="256" r:id="rId2"/>
     <p:sldId id="257" r:id="rId3"/>
-    <p:sldId id="259" r:id="rId4"/>
-    <p:sldId id="258" r:id="rId5"/>
+    <p:sldId id="260" r:id="rId4"/>
+    <p:sldId id="259" r:id="rId5"/>
+    <p:sldId id="258" r:id="rId6"/>
   </p:sldIdLst>
   <p:sldSz cx="12192000" cy="6858000"/>
   <p:notesSz cx="6858000" cy="9144000"/>
@@ -262,7 +263,7 @@
           <a:p>
             <a:fld id="{AD94A44F-89A4-9943-854E-E7FE492F9B98}" type="datetimeFigureOut">
               <a:rPr lang="en-US" smtClean="0"/>
-              <a:t>5/27/24</a:t>
+              <a:t>6/2/24</a:t>
             </a:fld>
             <a:endParaRPr lang="en-US"/>
           </a:p>
@@ -460,7 +461,7 @@
           <a:p>
             <a:fld id="{AD94A44F-89A4-9943-854E-E7FE492F9B98}" type="datetimeFigureOut">
               <a:rPr lang="en-US" smtClean="0"/>
-              <a:t>5/27/24</a:t>
+              <a:t>6/2/24</a:t>
             </a:fld>
             <a:endParaRPr lang="en-US"/>
           </a:p>
@@ -668,7 +669,7 @@
           <a:p>
             <a:fld id="{AD94A44F-89A4-9943-854E-E7FE492F9B98}" type="datetimeFigureOut">
               <a:rPr lang="en-US" smtClean="0"/>
-              <a:t>5/27/24</a:t>
+              <a:t>6/2/24</a:t>
             </a:fld>
             <a:endParaRPr lang="en-US"/>
           </a:p>
@@ -866,7 +867,7 @@
           <a:p>
             <a:fld id="{AD94A44F-89A4-9943-854E-E7FE492F9B98}" type="datetimeFigureOut">
               <a:rPr lang="en-US" smtClean="0"/>
-              <a:t>5/27/24</a:t>
+              <a:t>6/2/24</a:t>
             </a:fld>
             <a:endParaRPr lang="en-US"/>
           </a:p>
@@ -1141,7 +1142,7 @@
           <a:p>
             <a:fld id="{AD94A44F-89A4-9943-854E-E7FE492F9B98}" type="datetimeFigureOut">
               <a:rPr lang="en-US" smtClean="0"/>
-              <a:t>5/27/24</a:t>
+              <a:t>6/2/24</a:t>
             </a:fld>
             <a:endParaRPr lang="en-US"/>
           </a:p>
@@ -1406,7 +1407,7 @@
           <a:p>
             <a:fld id="{AD94A44F-89A4-9943-854E-E7FE492F9B98}" type="datetimeFigureOut">
               <a:rPr lang="en-US" smtClean="0"/>
-              <a:t>5/27/24</a:t>
+              <a:t>6/2/24</a:t>
             </a:fld>
             <a:endParaRPr lang="en-US"/>
           </a:p>
@@ -1818,7 +1819,7 @@
           <a:p>
             <a:fld id="{AD94A44F-89A4-9943-854E-E7FE492F9B98}" type="datetimeFigureOut">
               <a:rPr lang="en-US" smtClean="0"/>
-              <a:t>5/27/24</a:t>
+              <a:t>6/2/24</a:t>
             </a:fld>
             <a:endParaRPr lang="en-US"/>
           </a:p>
@@ -1959,7 +1960,7 @@
           <a:p>
             <a:fld id="{AD94A44F-89A4-9943-854E-E7FE492F9B98}" type="datetimeFigureOut">
               <a:rPr lang="en-US" smtClean="0"/>
-              <a:t>5/27/24</a:t>
+              <a:t>6/2/24</a:t>
             </a:fld>
             <a:endParaRPr lang="en-US"/>
           </a:p>
@@ -2072,7 +2073,7 @@
           <a:p>
             <a:fld id="{AD94A44F-89A4-9943-854E-E7FE492F9B98}" type="datetimeFigureOut">
               <a:rPr lang="en-US" smtClean="0"/>
-              <a:t>5/27/24</a:t>
+              <a:t>6/2/24</a:t>
             </a:fld>
             <a:endParaRPr lang="en-US"/>
           </a:p>
@@ -2383,7 +2384,7 @@
           <a:p>
             <a:fld id="{AD94A44F-89A4-9943-854E-E7FE492F9B98}" type="datetimeFigureOut">
               <a:rPr lang="en-US" smtClean="0"/>
-              <a:t>5/27/24</a:t>
+              <a:t>6/2/24</a:t>
             </a:fld>
             <a:endParaRPr lang="en-US"/>
           </a:p>
@@ -2671,7 +2672,7 @@
           <a:p>
             <a:fld id="{AD94A44F-89A4-9943-854E-E7FE492F9B98}" type="datetimeFigureOut">
               <a:rPr lang="en-US" smtClean="0"/>
-              <a:t>5/27/24</a:t>
+              <a:t>6/2/24</a:t>
             </a:fld>
             <a:endParaRPr lang="en-US"/>
           </a:p>
@@ -2912,7 +2913,7 @@
           <a:p>
             <a:fld id="{AD94A44F-89A4-9943-854E-E7FE492F9B98}" type="datetimeFigureOut">
               <a:rPr lang="en-US" smtClean="0"/>
-              <a:t>5/27/24</a:t>
+              <a:t>6/2/24</a:t>
             </a:fld>
             <a:endParaRPr lang="en-US"/>
           </a:p>
@@ -3541,6 +3542,174 @@
         <p:cNvPr id="1" name="">
           <a:extLst>
             <a:ext uri="{FF2B5EF4-FFF2-40B4-BE49-F238E27FC236}">
+              <a16:creationId xmlns:a16="http://schemas.microsoft.com/office/drawing/2014/main" id="{2E9F726D-88F8-3FB6-8BFA-CAC60856CD5D}"/>
+            </a:ext>
+          </a:extLst>
+        </p:cNvPr>
+        <p:cNvGrpSpPr/>
+        <p:nvPr/>
+      </p:nvGrpSpPr>
+      <p:grpSpPr>
+        <a:xfrm>
+          <a:off x="0" y="0"/>
+          <a:ext cx="0" cy="0"/>
+          <a:chOff x="0" y="0"/>
+          <a:chExt cx="0" cy="0"/>
+        </a:xfrm>
+      </p:grpSpPr>
+      <p:sp>
+        <p:nvSpPr>
+          <p:cNvPr id="4" name="TextBox 3">
+            <a:extLst>
+              <a:ext uri="{FF2B5EF4-FFF2-40B4-BE49-F238E27FC236}">
+                <a16:creationId xmlns:a16="http://schemas.microsoft.com/office/drawing/2014/main" id="{9384A0F7-6742-7062-8D35-6D4029E783FA}"/>
+              </a:ext>
+            </a:extLst>
+          </p:cNvPr>
+          <p:cNvSpPr txBox="1"/>
+          <p:nvPr/>
+        </p:nvSpPr>
+        <p:spPr>
+          <a:xfrm>
+            <a:off x="5513173" y="3282432"/>
+            <a:ext cx="3233351" cy="3477875"/>
+          </a:xfrm>
+          <a:prstGeom prst="rect">
+            <a:avLst/>
+          </a:prstGeom>
+          <a:noFill/>
+        </p:spPr>
+        <p:txBody>
+          <a:bodyPr wrap="square" rtlCol="0" anchor="ctr">
+            <a:spAutoFit/>
+          </a:bodyPr>
+          <a:lstStyle/>
+          <a:p>
+            <a:pPr algn="ctr"/>
+            <a:r>
+              <a:rPr lang="en-US" sz="22000" dirty="0">
+                <a:latin typeface="Aller" panose="02000503030000020004" pitchFamily="2" charset="77"/>
+              </a:rPr>
+              <a:t>💸</a:t>
+            </a:r>
+          </a:p>
+        </p:txBody>
+      </p:sp>
+      <p:sp>
+        <p:nvSpPr>
+          <p:cNvPr id="5" name="TextBox 4">
+            <a:extLst>
+              <a:ext uri="{FF2B5EF4-FFF2-40B4-BE49-F238E27FC236}">
+                <a16:creationId xmlns:a16="http://schemas.microsoft.com/office/drawing/2014/main" id="{168ADFF5-CD46-0976-FB13-050EAB4F28F7}"/>
+              </a:ext>
+            </a:extLst>
+          </p:cNvPr>
+          <p:cNvSpPr txBox="1"/>
+          <p:nvPr/>
+        </p:nvSpPr>
+        <p:spPr>
+          <a:xfrm>
+            <a:off x="3023287" y="1125608"/>
+            <a:ext cx="3822357" cy="3170099"/>
+          </a:xfrm>
+          <a:prstGeom prst="rect">
+            <a:avLst/>
+          </a:prstGeom>
+          <a:noFill/>
+        </p:spPr>
+        <p:txBody>
+          <a:bodyPr wrap="square" rtlCol="0" anchor="ctr">
+            <a:spAutoFit/>
+          </a:bodyPr>
+          <a:lstStyle/>
+          <a:p>
+            <a:pPr algn="ctr"/>
+            <a:r>
+              <a:rPr lang="en-US" sz="20000" dirty="0">
+                <a:latin typeface="Aller" panose="02000503030000020004" pitchFamily="2" charset="77"/>
+              </a:rPr>
+              <a:t>⚾️</a:t>
+            </a:r>
+            <a:endParaRPr lang="en-US" sz="20000" dirty="0"/>
+          </a:p>
+        </p:txBody>
+      </p:sp>
+      <p:sp>
+        <p:nvSpPr>
+          <p:cNvPr id="2" name="Rectangle 1">
+            <a:extLst>
+              <a:ext uri="{FF2B5EF4-FFF2-40B4-BE49-F238E27FC236}">
+                <a16:creationId xmlns:a16="http://schemas.microsoft.com/office/drawing/2014/main" id="{F28117F2-4B84-5EA4-C255-8D08DFFB4C32}"/>
+              </a:ext>
+            </a:extLst>
+          </p:cNvPr>
+          <p:cNvSpPr/>
+          <p:nvPr/>
+        </p:nvSpPr>
+        <p:spPr>
+          <a:xfrm>
+            <a:off x="3445475" y="778475"/>
+            <a:ext cx="5301049" cy="5301049"/>
+          </a:xfrm>
+          <a:prstGeom prst="rect">
+            <a:avLst/>
+          </a:prstGeom>
+          <a:noFill/>
+        </p:spPr>
+        <p:style>
+          <a:lnRef idx="2">
+            <a:schemeClr val="accent1">
+              <a:shade val="15000"/>
+            </a:schemeClr>
+          </a:lnRef>
+          <a:fillRef idx="1">
+            <a:schemeClr val="accent1"/>
+          </a:fillRef>
+          <a:effectRef idx="0">
+            <a:schemeClr val="accent1"/>
+          </a:effectRef>
+          <a:fontRef idx="minor">
+            <a:schemeClr val="lt1"/>
+          </a:fontRef>
+        </p:style>
+        <p:txBody>
+          <a:bodyPr rtlCol="0" anchor="ctr"/>
+          <a:lstStyle/>
+          <a:p>
+            <a:pPr algn="ctr"/>
+            <a:endParaRPr lang="en-US"/>
+          </a:p>
+        </p:txBody>
+      </p:sp>
+    </p:spTree>
+    <p:extLst>
+      <p:ext uri="{BB962C8B-B14F-4D97-AF65-F5344CB8AC3E}">
+        <p14:creationId xmlns:p14="http://schemas.microsoft.com/office/powerpoint/2010/main" val="2225510850"/>
+      </p:ext>
+    </p:extLst>
+  </p:cSld>
+  <p:clrMapOvr>
+    <a:masterClrMapping/>
+  </p:clrMapOvr>
+</p:sld>
+</file>
+
+<file path=ppt/slides/slide4.xml><?xml version="1.0" encoding="utf-8"?>
+<p:sld xmlns:a="http://schemas.openxmlformats.org/drawingml/2006/main" xmlns:r="http://schemas.openxmlformats.org/officeDocument/2006/relationships" xmlns:p="http://schemas.openxmlformats.org/presentationml/2006/main">
+  <p:cSld>
+    <p:bg>
+      <p:bgPr>
+        <a:solidFill>
+          <a:srgbClr val="32CE32"/>
+        </a:solidFill>
+        <a:effectLst/>
+      </p:bgPr>
+    </p:bg>
+    <p:spTree>
+      <p:nvGrpSpPr>
+        <p:cNvPr id="1" name="">
+          <a:extLst>
+            <a:ext uri="{FF2B5EF4-FFF2-40B4-BE49-F238E27FC236}">
               <a16:creationId xmlns:a16="http://schemas.microsoft.com/office/drawing/2014/main" id="{19237ECC-5013-8EE2-2C21-6E173A580520}"/>
             </a:ext>
           </a:extLst>
@@ -3646,7 +3815,7 @@
 </p:sld>
 </file>
 
-<file path=ppt/slides/slide4.xml><?xml version="1.0" encoding="utf-8"?>
+<file path=ppt/slides/slide5.xml><?xml version="1.0" encoding="utf-8"?>
 <p:sld xmlns:a="http://schemas.openxmlformats.org/drawingml/2006/main" xmlns:r="http://schemas.openxmlformats.org/officeDocument/2006/relationships" xmlns:p="http://schemas.openxmlformats.org/presentationml/2006/main">
   <p:cSld>
     <p:bg>

</xml_diff>